<commit_message>
Added unit tests for 6 more MS PowerPoint file formats.
</commit_message>
<xml_diff>
--- a/norconex-importer/src/test/resources/parser/msoffice/powerpoint.pptx
+++ b/norconex-importer/src/test/resources/parser/msoffice/powerpoint.pptx
@@ -304,7 +304,7 @@
           <a:p>
             <a:fld id="{26B401AD-CE86-43E5-8F4E-76E914F69ED0}" type="datetimeFigureOut">
               <a:rPr lang="en-US" smtClean="0"/>
-              <a:t>3/12/2015</a:t>
+              <a:t>3/17/2015</a:t>
             </a:fld>
             <a:endParaRPr lang="en-CA"/>
           </a:p>
@@ -469,7 +469,7 @@
           <a:p>
             <a:fld id="{26B401AD-CE86-43E5-8F4E-76E914F69ED0}" type="datetimeFigureOut">
               <a:rPr lang="en-US" smtClean="0"/>
-              <a:t>3/12/2015</a:t>
+              <a:t>3/17/2015</a:t>
             </a:fld>
             <a:endParaRPr lang="en-CA"/>
           </a:p>
@@ -644,7 +644,7 @@
           <a:p>
             <a:fld id="{26B401AD-CE86-43E5-8F4E-76E914F69ED0}" type="datetimeFigureOut">
               <a:rPr lang="en-US" smtClean="0"/>
-              <a:t>3/12/2015</a:t>
+              <a:t>3/17/2015</a:t>
             </a:fld>
             <a:endParaRPr lang="en-CA"/>
           </a:p>
@@ -809,7 +809,7 @@
           <a:p>
             <a:fld id="{26B401AD-CE86-43E5-8F4E-76E914F69ED0}" type="datetimeFigureOut">
               <a:rPr lang="en-US" smtClean="0"/>
-              <a:t>3/12/2015</a:t>
+              <a:t>3/17/2015</a:t>
             </a:fld>
             <a:endParaRPr lang="en-CA"/>
           </a:p>
@@ -1050,7 +1050,7 @@
           <a:p>
             <a:fld id="{26B401AD-CE86-43E5-8F4E-76E914F69ED0}" type="datetimeFigureOut">
               <a:rPr lang="en-US" smtClean="0"/>
-              <a:t>3/12/2015</a:t>
+              <a:t>3/17/2015</a:t>
             </a:fld>
             <a:endParaRPr lang="en-CA"/>
           </a:p>
@@ -1333,7 +1333,7 @@
           <a:p>
             <a:fld id="{26B401AD-CE86-43E5-8F4E-76E914F69ED0}" type="datetimeFigureOut">
               <a:rPr lang="en-US" smtClean="0"/>
-              <a:t>3/12/2015</a:t>
+              <a:t>3/17/2015</a:t>
             </a:fld>
             <a:endParaRPr lang="en-CA"/>
           </a:p>
@@ -1750,7 +1750,7 @@
           <a:p>
             <a:fld id="{26B401AD-CE86-43E5-8F4E-76E914F69ED0}" type="datetimeFigureOut">
               <a:rPr lang="en-US" smtClean="0"/>
-              <a:t>3/12/2015</a:t>
+              <a:t>3/17/2015</a:t>
             </a:fld>
             <a:endParaRPr lang="en-CA"/>
           </a:p>
@@ -1863,7 +1863,7 @@
           <a:p>
             <a:fld id="{26B401AD-CE86-43E5-8F4E-76E914F69ED0}" type="datetimeFigureOut">
               <a:rPr lang="en-US" smtClean="0"/>
-              <a:t>3/12/2015</a:t>
+              <a:t>3/17/2015</a:t>
             </a:fld>
             <a:endParaRPr lang="en-CA"/>
           </a:p>
@@ -1953,7 +1953,7 @@
           <a:p>
             <a:fld id="{26B401AD-CE86-43E5-8F4E-76E914F69ED0}" type="datetimeFigureOut">
               <a:rPr lang="en-US" smtClean="0"/>
-              <a:t>3/12/2015</a:t>
+              <a:t>3/17/2015</a:t>
             </a:fld>
             <a:endParaRPr lang="en-CA"/>
           </a:p>
@@ -2225,7 +2225,7 @@
           <a:p>
             <a:fld id="{26B401AD-CE86-43E5-8F4E-76E914F69ED0}" type="datetimeFigureOut">
               <a:rPr lang="en-US" smtClean="0"/>
-              <a:t>3/12/2015</a:t>
+              <a:t>3/17/2015</a:t>
             </a:fld>
             <a:endParaRPr lang="en-CA"/>
           </a:p>
@@ -2473,7 +2473,7 @@
           <a:p>
             <a:fld id="{26B401AD-CE86-43E5-8F4E-76E914F69ED0}" type="datetimeFigureOut">
               <a:rPr lang="en-US" smtClean="0"/>
-              <a:t>3/12/2015</a:t>
+              <a:t>3/17/2015</a:t>
             </a:fld>
             <a:endParaRPr lang="en-CA"/>
           </a:p>
@@ -2681,7 +2681,7 @@
           <a:p>
             <a:fld id="{26B401AD-CE86-43E5-8F4E-76E914F69ED0}" type="datetimeFigureOut">
               <a:rPr lang="en-US" smtClean="0"/>
-              <a:t>3/12/2015</a:t>
+              <a:t>3/17/2015</a:t>
             </a:fld>
             <a:endParaRPr lang="en-CA"/>
           </a:p>
@@ -3070,7 +3070,6 @@
               <a:rPr lang="en-CA" dirty="0"/>
               <a:t>Hey Norconex, this is a test.</a:t>
             </a:r>
-            <a:endParaRPr lang="en-CA" dirty="0"/>
           </a:p>
         </p:txBody>
       </p:sp>

</xml_diff>